<commit_message>
added a telegram chat
</commit_message>
<xml_diff>
--- a/gui/pyqt_start.pptx
+++ b/gui/pyqt_start.pptx
@@ -227,7 +227,7 @@
           <a:p>
             <a:fld id="{2407CA34-A781-4867-B1F0-8A68915E2129}" type="datetimeFigureOut">
               <a:rPr lang="en-US" smtClean="0"/>
-              <a:t>2/14/2023</a:t>
+              <a:t>2/1/2024</a:t>
             </a:fld>
             <a:endParaRPr lang="en-US"/>
           </a:p>
@@ -2978,7 +2978,7 @@
           <a:p>
             <a:fld id="{A9EE6800-633F-4576-A48A-D4179C2C01D4}" type="datetimeFigureOut">
               <a:rPr lang="en-US" smtClean="0"/>
-              <a:t>2/14/2023</a:t>
+              <a:t>2/1/2024</a:t>
             </a:fld>
             <a:endParaRPr lang="en-US"/>
           </a:p>
@@ -3148,7 +3148,7 @@
           <a:p>
             <a:fld id="{A9EE6800-633F-4576-A48A-D4179C2C01D4}" type="datetimeFigureOut">
               <a:rPr lang="en-US" smtClean="0"/>
-              <a:t>2/14/2023</a:t>
+              <a:t>2/1/2024</a:t>
             </a:fld>
             <a:endParaRPr lang="en-US"/>
           </a:p>
@@ -3328,7 +3328,7 @@
           <a:p>
             <a:fld id="{A9EE6800-633F-4576-A48A-D4179C2C01D4}" type="datetimeFigureOut">
               <a:rPr lang="en-US" smtClean="0"/>
-              <a:t>2/14/2023</a:t>
+              <a:t>2/1/2024</a:t>
             </a:fld>
             <a:endParaRPr lang="en-US"/>
           </a:p>
@@ -3498,7 +3498,7 @@
           <a:p>
             <a:fld id="{A9EE6800-633F-4576-A48A-D4179C2C01D4}" type="datetimeFigureOut">
               <a:rPr lang="en-US" smtClean="0"/>
-              <a:t>2/14/2023</a:t>
+              <a:t>2/1/2024</a:t>
             </a:fld>
             <a:endParaRPr lang="en-US"/>
           </a:p>
@@ -3744,7 +3744,7 @@
           <a:p>
             <a:fld id="{A9EE6800-633F-4576-A48A-D4179C2C01D4}" type="datetimeFigureOut">
               <a:rPr lang="en-US" smtClean="0"/>
-              <a:t>2/14/2023</a:t>
+              <a:t>2/1/2024</a:t>
             </a:fld>
             <a:endParaRPr lang="en-US"/>
           </a:p>
@@ -3976,7 +3976,7 @@
           <a:p>
             <a:fld id="{A9EE6800-633F-4576-A48A-D4179C2C01D4}" type="datetimeFigureOut">
               <a:rPr lang="en-US" smtClean="0"/>
-              <a:t>2/14/2023</a:t>
+              <a:t>2/1/2024</a:t>
             </a:fld>
             <a:endParaRPr lang="en-US"/>
           </a:p>
@@ -4343,7 +4343,7 @@
           <a:p>
             <a:fld id="{A9EE6800-633F-4576-A48A-D4179C2C01D4}" type="datetimeFigureOut">
               <a:rPr lang="en-US" smtClean="0"/>
-              <a:t>2/14/2023</a:t>
+              <a:t>2/1/2024</a:t>
             </a:fld>
             <a:endParaRPr lang="en-US"/>
           </a:p>
@@ -4461,7 +4461,7 @@
           <a:p>
             <a:fld id="{A9EE6800-633F-4576-A48A-D4179C2C01D4}" type="datetimeFigureOut">
               <a:rPr lang="en-US" smtClean="0"/>
-              <a:t>2/14/2023</a:t>
+              <a:t>2/1/2024</a:t>
             </a:fld>
             <a:endParaRPr lang="en-US"/>
           </a:p>
@@ -4556,7 +4556,7 @@
           <a:p>
             <a:fld id="{A9EE6800-633F-4576-A48A-D4179C2C01D4}" type="datetimeFigureOut">
               <a:rPr lang="en-US" smtClean="0"/>
-              <a:t>2/14/2023</a:t>
+              <a:t>2/1/2024</a:t>
             </a:fld>
             <a:endParaRPr lang="en-US"/>
           </a:p>
@@ -4833,7 +4833,7 @@
           <a:p>
             <a:fld id="{A9EE6800-633F-4576-A48A-D4179C2C01D4}" type="datetimeFigureOut">
               <a:rPr lang="en-US" smtClean="0"/>
-              <a:t>2/14/2023</a:t>
+              <a:t>2/1/2024</a:t>
             </a:fld>
             <a:endParaRPr lang="en-US"/>
           </a:p>
@@ -5086,7 +5086,7 @@
           <a:p>
             <a:fld id="{A9EE6800-633F-4576-A48A-D4179C2C01D4}" type="datetimeFigureOut">
               <a:rPr lang="en-US" smtClean="0"/>
-              <a:t>2/14/2023</a:t>
+              <a:t>2/1/2024</a:t>
             </a:fld>
             <a:endParaRPr lang="en-US"/>
           </a:p>
@@ -5299,7 +5299,7 @@
           <a:p>
             <a:fld id="{A9EE6800-633F-4576-A48A-D4179C2C01D4}" type="datetimeFigureOut">
               <a:rPr lang="en-US" smtClean="0"/>
-              <a:t>2/14/2023</a:t>
+              <a:t>2/1/2024</a:t>
             </a:fld>
             <a:endParaRPr lang="en-US"/>
           </a:p>
@@ -6297,8 +6297,8 @@
         </p:nvSpPr>
         <p:spPr>
           <a:xfrm>
-            <a:off x="3376261" y="2641359"/>
-            <a:ext cx="3836307" cy="3108543"/>
+            <a:off x="965570" y="2059468"/>
+            <a:ext cx="4297971" cy="3108543"/>
           </a:xfrm>
           <a:prstGeom prst="rect">
             <a:avLst/>
@@ -6310,6 +6310,10 @@
           </a:bodyPr>
           <a:lstStyle/>
           <a:p>
+            <a:pPr marL="457200" indent="-457200">
+              <a:buFont typeface="Arial" panose="020B0604020202020204" pitchFamily="34" charset="0"/>
+              <a:buChar char="•"/>
+            </a:pPr>
             <a:r>
               <a:rPr lang="en-US" sz="2800" dirty="0">
                 <a:latin typeface="Source Code Pro" panose="020B0509030403020204" pitchFamily="49" charset="0"/>
@@ -6318,6 +6322,10 @@
             </a:r>
           </a:p>
           <a:p>
+            <a:pPr marL="457200" indent="-457200">
+              <a:buFont typeface="Arial" panose="020B0604020202020204" pitchFamily="34" charset="0"/>
+              <a:buChar char="•"/>
+            </a:pPr>
             <a:r>
               <a:rPr lang="en-US" sz="2800" dirty="0">
                 <a:latin typeface="Source Code Pro" panose="020B0509030403020204" pitchFamily="49" charset="0"/>
@@ -6326,6 +6334,10 @@
             </a:r>
           </a:p>
           <a:p>
+            <a:pPr marL="457200" indent="-457200">
+              <a:buFont typeface="Arial" panose="020B0604020202020204" pitchFamily="34" charset="0"/>
+              <a:buChar char="•"/>
+            </a:pPr>
             <a:r>
               <a:rPr lang="en-US" sz="2800" dirty="0">
                 <a:latin typeface="Source Code Pro" panose="020B0509030403020204" pitchFamily="49" charset="0"/>
@@ -6334,6 +6346,10 @@
             </a:r>
           </a:p>
           <a:p>
+            <a:pPr marL="457200" indent="-457200">
+              <a:buFont typeface="Arial" panose="020B0604020202020204" pitchFamily="34" charset="0"/>
+              <a:buChar char="•"/>
+            </a:pPr>
             <a:r>
               <a:rPr lang="en-US" sz="2800" dirty="0">
                 <a:latin typeface="Source Code Pro" panose="020B0509030403020204" pitchFamily="49" charset="0"/>
@@ -6342,6 +6358,10 @@
             </a:r>
           </a:p>
           <a:p>
+            <a:pPr marL="457200" indent="-457200">
+              <a:buFont typeface="Arial" panose="020B0604020202020204" pitchFamily="34" charset="0"/>
+              <a:buChar char="•"/>
+            </a:pPr>
             <a:r>
               <a:rPr lang="en-US" sz="2800" dirty="0">
                 <a:latin typeface="Source Code Pro" panose="020B0509030403020204" pitchFamily="49" charset="0"/>
@@ -6350,6 +6370,10 @@
             </a:r>
           </a:p>
           <a:p>
+            <a:pPr marL="457200" indent="-457200">
+              <a:buFont typeface="Arial" panose="020B0604020202020204" pitchFamily="34" charset="0"/>
+              <a:buChar char="•"/>
+            </a:pPr>
             <a:r>
               <a:rPr lang="en-US" sz="2800" dirty="0">
                 <a:latin typeface="Source Code Pro" panose="020B0509030403020204" pitchFamily="49" charset="0"/>
@@ -6358,6 +6382,10 @@
             </a:r>
           </a:p>
           <a:p>
+            <a:pPr marL="457200" indent="-457200">
+              <a:buFont typeface="Arial" panose="020B0604020202020204" pitchFamily="34" charset="0"/>
+              <a:buChar char="•"/>
+            </a:pPr>
             <a:r>
               <a:rPr lang="en-US" sz="2800" dirty="0">
                 <a:latin typeface="Source Code Pro" panose="020B0509030403020204" pitchFamily="49" charset="0"/>
@@ -6405,8 +6433,8 @@
         </p:nvSpPr>
         <p:spPr>
           <a:xfrm>
-            <a:off x="4644007" y="2719403"/>
-            <a:ext cx="2125903" cy="646331"/>
+            <a:off x="4574734" y="2165221"/>
+            <a:ext cx="2765501" cy="830997"/>
           </a:xfrm>
           <a:prstGeom prst="rect">
             <a:avLst/>
@@ -6419,12 +6447,12 @@
           <a:lstStyle/>
           <a:p>
             <a:r>
-              <a:rPr lang="en-US" sz="3600" b="1" dirty="0" smtClean="0">
+              <a:rPr lang="en-US" sz="4800" b="1" dirty="0" smtClean="0">
                 <a:latin typeface="Source Code Pro" panose="020B0509030403020204" pitchFamily="49" charset="0"/>
               </a:rPr>
               <a:t>Widgets</a:t>
             </a:r>
-            <a:endParaRPr lang="en-US" sz="3600" b="1" dirty="0">
+            <a:endParaRPr lang="en-US" sz="4800" b="1" dirty="0">
               <a:latin typeface="Source Code Pro" panose="020B0509030403020204" pitchFamily="49" charset="0"/>
             </a:endParaRPr>
           </a:p>
@@ -6551,8 +6579,8 @@
         </p:nvSpPr>
         <p:spPr>
           <a:xfrm>
-            <a:off x="8655568" y="1242074"/>
-            <a:ext cx="1495218" cy="1477328"/>
+            <a:off x="4762440" y="757165"/>
+            <a:ext cx="2125903" cy="646331"/>
           </a:xfrm>
           <a:prstGeom prst="rect">
             <a:avLst/>
@@ -6565,34 +6593,14 @@
           <a:lstStyle/>
           <a:p>
             <a:r>
-              <a:rPr lang="en-US" dirty="0"/>
+              <a:rPr lang="en-US" sz="3600" dirty="0" smtClean="0">
+                <a:latin typeface="Source Code Pro" panose="020B0509030403020204" pitchFamily="49" charset="0"/>
+              </a:rPr>
               <a:t>Buttons</a:t>
             </a:r>
-          </a:p>
-          <a:p>
-            <a:r>
-              <a:rPr lang="en-US" dirty="0"/>
-              <a:t>Labels</a:t>
-            </a:r>
-          </a:p>
-          <a:p>
-            <a:r>
-              <a:rPr lang="en-US" dirty="0"/>
-              <a:t>Line edits</a:t>
-            </a:r>
-          </a:p>
-          <a:p>
-            <a:r>
-              <a:rPr lang="en-US" dirty="0"/>
-              <a:t>Combo boxes</a:t>
-            </a:r>
-          </a:p>
-          <a:p>
-            <a:r>
-              <a:rPr lang="en-US" dirty="0" smtClean="0"/>
-              <a:t>Radio buttons</a:t>
-            </a:r>
-            <a:endParaRPr lang="en-US" dirty="0"/>
+            <a:endParaRPr lang="en-US" sz="3600" dirty="0">
+              <a:latin typeface="Source Code Pro" panose="020B0509030403020204" pitchFamily="49" charset="0"/>
+            </a:endParaRPr>
           </a:p>
         </p:txBody>
       </p:sp>
@@ -6612,8 +6620,8 @@
         </p:blipFill>
         <p:spPr>
           <a:xfrm>
-            <a:off x="3179543" y="3215150"/>
-            <a:ext cx="4275225" cy="1103284"/>
+            <a:off x="2928061" y="2688677"/>
+            <a:ext cx="5794659" cy="1495396"/>
           </a:xfrm>
           <a:prstGeom prst="rect">
             <a:avLst/>
@@ -6650,59 +6658,6 @@
           <a:chExt cx="0" cy="0"/>
         </a:xfrm>
       </p:grpSpPr>
-      <p:sp>
-        <p:nvSpPr>
-          <p:cNvPr id="3" name="Rectangle 2"/>
-          <p:cNvSpPr/>
-          <p:nvPr/>
-        </p:nvSpPr>
-        <p:spPr>
-          <a:xfrm>
-            <a:off x="8655568" y="1242074"/>
-            <a:ext cx="1495218" cy="1477328"/>
-          </a:xfrm>
-          <a:prstGeom prst="rect">
-            <a:avLst/>
-          </a:prstGeom>
-        </p:spPr>
-        <p:txBody>
-          <a:bodyPr wrap="none">
-            <a:spAutoFit/>
-          </a:bodyPr>
-          <a:lstStyle/>
-          <a:p>
-            <a:r>
-              <a:rPr lang="en-US" dirty="0"/>
-              <a:t>Buttons</a:t>
-            </a:r>
-          </a:p>
-          <a:p>
-            <a:r>
-              <a:rPr lang="en-US" dirty="0"/>
-              <a:t>Labels</a:t>
-            </a:r>
-          </a:p>
-          <a:p>
-            <a:r>
-              <a:rPr lang="en-US" dirty="0"/>
-              <a:t>Line edits</a:t>
-            </a:r>
-          </a:p>
-          <a:p>
-            <a:r>
-              <a:rPr lang="en-US" dirty="0"/>
-              <a:t>Combo boxes</a:t>
-            </a:r>
-          </a:p>
-          <a:p>
-            <a:r>
-              <a:rPr lang="en-US" dirty="0" smtClean="0"/>
-              <a:t>Radio buttons</a:t>
-            </a:r>
-            <a:endParaRPr lang="en-US" dirty="0"/>
-          </a:p>
-        </p:txBody>
-      </p:sp>
       <p:pic>
         <p:nvPicPr>
           <p:cNvPr id="5" name="Picture 4"/>
@@ -6727,6 +6682,39 @@
           </a:prstGeom>
         </p:spPr>
       </p:pic>
+      <p:sp>
+        <p:nvSpPr>
+          <p:cNvPr id="2" name="Rectangle 1"/>
+          <p:cNvSpPr/>
+          <p:nvPr/>
+        </p:nvSpPr>
+        <p:spPr>
+          <a:xfrm>
+            <a:off x="5002933" y="595743"/>
+            <a:ext cx="1848583" cy="646331"/>
+          </a:xfrm>
+          <a:prstGeom prst="rect">
+            <a:avLst/>
+          </a:prstGeom>
+        </p:spPr>
+        <p:txBody>
+          <a:bodyPr wrap="none">
+            <a:spAutoFit/>
+          </a:bodyPr>
+          <a:lstStyle/>
+          <a:p>
+            <a:r>
+              <a:rPr lang="en-US" sz="3600" dirty="0">
+                <a:latin typeface="Source Code Pro" panose="020B0509030403020204" pitchFamily="49" charset="0"/>
+              </a:rPr>
+              <a:t>Labels</a:t>
+            </a:r>
+            <a:endParaRPr lang="en-US" sz="3600" dirty="0">
+              <a:latin typeface="Source Code Pro" panose="020B0509030403020204" pitchFamily="49" charset="0"/>
+            </a:endParaRPr>
+          </a:p>
+        </p:txBody>
+      </p:sp>
     </p:spTree>
     <p:extLst>
       <p:ext uri="{BB962C8B-B14F-4D97-AF65-F5344CB8AC3E}">
@@ -6757,59 +6745,6 @@
           <a:chExt cx="0" cy="0"/>
         </a:xfrm>
       </p:grpSpPr>
-      <p:sp>
-        <p:nvSpPr>
-          <p:cNvPr id="3" name="Rectangle 2"/>
-          <p:cNvSpPr/>
-          <p:nvPr/>
-        </p:nvSpPr>
-        <p:spPr>
-          <a:xfrm>
-            <a:off x="8655568" y="1242074"/>
-            <a:ext cx="1495218" cy="1477328"/>
-          </a:xfrm>
-          <a:prstGeom prst="rect">
-            <a:avLst/>
-          </a:prstGeom>
-        </p:spPr>
-        <p:txBody>
-          <a:bodyPr wrap="none">
-            <a:spAutoFit/>
-          </a:bodyPr>
-          <a:lstStyle/>
-          <a:p>
-            <a:r>
-              <a:rPr lang="en-US" dirty="0"/>
-              <a:t>Buttons</a:t>
-            </a:r>
-          </a:p>
-          <a:p>
-            <a:r>
-              <a:rPr lang="en-US" dirty="0"/>
-              <a:t>Labels</a:t>
-            </a:r>
-          </a:p>
-          <a:p>
-            <a:r>
-              <a:rPr lang="en-US" dirty="0"/>
-              <a:t>Line edits</a:t>
-            </a:r>
-          </a:p>
-          <a:p>
-            <a:r>
-              <a:rPr lang="en-US" dirty="0"/>
-              <a:t>Combo boxes</a:t>
-            </a:r>
-          </a:p>
-          <a:p>
-            <a:r>
-              <a:rPr lang="en-US" dirty="0" smtClean="0"/>
-              <a:t>Radio buttons</a:t>
-            </a:r>
-            <a:endParaRPr lang="en-US" dirty="0"/>
-          </a:p>
-        </p:txBody>
-      </p:sp>
       <p:pic>
         <p:nvPicPr>
           <p:cNvPr id="2" name="Picture 1"/>
@@ -6826,7 +6761,7 @@
         </p:blipFill>
         <p:spPr>
           <a:xfrm>
-            <a:off x="2347177" y="3085878"/>
+            <a:off x="2347176" y="2642532"/>
             <a:ext cx="7056000" cy="1397631"/>
           </a:xfrm>
           <a:prstGeom prst="rect">
@@ -6834,6 +6769,39 @@
           </a:prstGeom>
         </p:spPr>
       </p:pic>
+      <p:sp>
+        <p:nvSpPr>
+          <p:cNvPr id="4" name="Rectangle 3"/>
+          <p:cNvSpPr/>
+          <p:nvPr/>
+        </p:nvSpPr>
+        <p:spPr>
+          <a:xfrm>
+            <a:off x="4396246" y="722806"/>
+            <a:ext cx="2957861" cy="646331"/>
+          </a:xfrm>
+          <a:prstGeom prst="rect">
+            <a:avLst/>
+          </a:prstGeom>
+        </p:spPr>
+        <p:txBody>
+          <a:bodyPr wrap="none">
+            <a:spAutoFit/>
+          </a:bodyPr>
+          <a:lstStyle/>
+          <a:p>
+            <a:r>
+              <a:rPr lang="en-US" sz="3600" dirty="0">
+                <a:latin typeface="Source Code Pro" panose="020B0509030403020204" pitchFamily="49" charset="0"/>
+              </a:rPr>
+              <a:t>Line edits</a:t>
+            </a:r>
+            <a:endParaRPr lang="en-US" sz="3600" dirty="0">
+              <a:latin typeface="Source Code Pro" panose="020B0509030403020204" pitchFamily="49" charset="0"/>
+            </a:endParaRPr>
+          </a:p>
+        </p:txBody>
+      </p:sp>
     </p:spTree>
     <p:extLst>
       <p:ext uri="{BB962C8B-B14F-4D97-AF65-F5344CB8AC3E}">
@@ -6864,59 +6832,6 @@
           <a:chExt cx="0" cy="0"/>
         </a:xfrm>
       </p:grpSpPr>
-      <p:sp>
-        <p:nvSpPr>
-          <p:cNvPr id="3" name="Rectangle 2"/>
-          <p:cNvSpPr/>
-          <p:nvPr/>
-        </p:nvSpPr>
-        <p:spPr>
-          <a:xfrm>
-            <a:off x="8655568" y="1242074"/>
-            <a:ext cx="1495218" cy="1477328"/>
-          </a:xfrm>
-          <a:prstGeom prst="rect">
-            <a:avLst/>
-          </a:prstGeom>
-        </p:spPr>
-        <p:txBody>
-          <a:bodyPr wrap="none">
-            <a:spAutoFit/>
-          </a:bodyPr>
-          <a:lstStyle/>
-          <a:p>
-            <a:r>
-              <a:rPr lang="en-US" dirty="0"/>
-              <a:t>Buttons</a:t>
-            </a:r>
-          </a:p>
-          <a:p>
-            <a:r>
-              <a:rPr lang="en-US" dirty="0"/>
-              <a:t>Labels</a:t>
-            </a:r>
-          </a:p>
-          <a:p>
-            <a:r>
-              <a:rPr lang="en-US" dirty="0"/>
-              <a:t>Line edits</a:t>
-            </a:r>
-          </a:p>
-          <a:p>
-            <a:r>
-              <a:rPr lang="en-US" dirty="0"/>
-              <a:t>Combo boxes</a:t>
-            </a:r>
-          </a:p>
-          <a:p>
-            <a:r>
-              <a:rPr lang="en-US" dirty="0" smtClean="0"/>
-              <a:t>Radio buttons</a:t>
-            </a:r>
-            <a:endParaRPr lang="en-US" dirty="0"/>
-          </a:p>
-        </p:txBody>
-      </p:sp>
       <p:pic>
         <p:nvPicPr>
           <p:cNvPr id="6" name="Picture 5"/>
@@ -6941,6 +6856,39 @@
           </a:prstGeom>
         </p:spPr>
       </p:pic>
+      <p:sp>
+        <p:nvSpPr>
+          <p:cNvPr id="2" name="Rectangle 1"/>
+          <p:cNvSpPr/>
+          <p:nvPr/>
+        </p:nvSpPr>
+        <p:spPr>
+          <a:xfrm>
+            <a:off x="4471217" y="657299"/>
+            <a:ext cx="2900153" cy="584775"/>
+          </a:xfrm>
+          <a:prstGeom prst="rect">
+            <a:avLst/>
+          </a:prstGeom>
+        </p:spPr>
+        <p:txBody>
+          <a:bodyPr wrap="none">
+            <a:spAutoFit/>
+          </a:bodyPr>
+          <a:lstStyle/>
+          <a:p>
+            <a:r>
+              <a:rPr lang="en-US" sz="3200" dirty="0">
+                <a:latin typeface="Source Code Pro" panose="020B0509030403020204" pitchFamily="49" charset="0"/>
+              </a:rPr>
+              <a:t>Combo boxes</a:t>
+            </a:r>
+            <a:endParaRPr lang="en-US" sz="3200" dirty="0">
+              <a:latin typeface="Source Code Pro" panose="020B0509030403020204" pitchFamily="49" charset="0"/>
+            </a:endParaRPr>
+          </a:p>
+        </p:txBody>
+      </p:sp>
     </p:spTree>
     <p:extLst>
       <p:ext uri="{BB962C8B-B14F-4D97-AF65-F5344CB8AC3E}">
@@ -8314,30 +8262,52 @@
           <a:chExt cx="0" cy="0"/>
         </a:xfrm>
       </p:grpSpPr>
-      <p:pic>
-        <p:nvPicPr>
-          <p:cNvPr id="2" name="Picture 1"/>
-          <p:cNvPicPr>
-            <a:picLocks noChangeAspect="1"/>
-          </p:cNvPicPr>
+      <p:sp>
+        <p:nvSpPr>
+          <p:cNvPr id="3" name="Rectangle 2"/>
+          <p:cNvSpPr/>
           <p:nvPr/>
-        </p:nvPicPr>
-        <p:blipFill>
-          <a:blip r:embed="rId2"/>
-          <a:stretch>
-            <a:fillRect/>
-          </a:stretch>
-        </p:blipFill>
+        </p:nvSpPr>
         <p:spPr>
           <a:xfrm>
-            <a:off x="4527742" y="2431992"/>
-            <a:ext cx="2434177" cy="716915"/>
+            <a:off x="3422072" y="2937164"/>
+            <a:ext cx="5500254" cy="848814"/>
           </a:xfrm>
           <a:prstGeom prst="rect">
             <a:avLst/>
           </a:prstGeom>
         </p:spPr>
-      </p:pic>
+        <p:style>
+          <a:lnRef idx="2">
+            <a:schemeClr val="dk1"/>
+          </a:lnRef>
+          <a:fillRef idx="1">
+            <a:schemeClr val="lt1"/>
+          </a:fillRef>
+          <a:effectRef idx="0">
+            <a:schemeClr val="dk1"/>
+          </a:effectRef>
+          <a:fontRef idx="minor">
+            <a:schemeClr val="dk1"/>
+          </a:fontRef>
+        </p:style>
+        <p:txBody>
+          <a:bodyPr rtlCol="0" anchor="ctr"/>
+          <a:lstStyle/>
+          <a:p>
+            <a:pPr algn="ctr"/>
+            <a:r>
+              <a:rPr lang="en-US" sz="3200" dirty="0" smtClean="0">
+                <a:latin typeface="Source Code Pro" panose="020B0509030403020204" pitchFamily="49" charset="0"/>
+              </a:rPr>
+              <a:t>pip install pyqt6</a:t>
+            </a:r>
+            <a:endParaRPr lang="en-US" sz="3200" dirty="0">
+              <a:latin typeface="Source Code Pro" panose="020B0509030403020204" pitchFamily="49" charset="0"/>
+            </a:endParaRPr>
+          </a:p>
+        </p:txBody>
+      </p:sp>
     </p:spTree>
     <p:extLst>
       <p:ext uri="{BB962C8B-B14F-4D97-AF65-F5344CB8AC3E}">

</xml_diff>